<commit_message>
Peer review arch diagram edits
</commit_message>
<xml_diff>
--- a/docs/deployment_guide/images/rhel8-local-mirror-architecture-diagram.pptx
+++ b/docs/deployment_guide/images/rhel8-local-mirror-architecture-diagram.pptx
@@ -1086,10 +1086,10 @@
       </p:grpSpPr>
       <p:sp>
         <p:nvSpPr>
-          <p:cNvPr id="7" name="Rectangle 6">
+          <p:cNvPr id="41" name="Rectangle 40">
             <a:extLst>
               <a:ext uri="{FF2B5EF4-FFF2-40B4-BE49-F238E27FC236}">
-                <a16:creationId xmlns:a16="http://schemas.microsoft.com/office/drawing/2014/main" id="{9B4B83F5-DBDE-5145-8C3D-869D8FCD01B1}"/>
+                <a16:creationId xmlns:a16="http://schemas.microsoft.com/office/drawing/2014/main" id="{B696D7B5-D97E-4FB6-80D3-74C0F6EE88ED}"/>
               </a:ext>
             </a:extLst>
           </p:cNvPr>
@@ -1098,17 +1098,20 @@
         </p:nvSpPr>
         <p:spPr>
           <a:xfrm>
-            <a:off x="626991" y="261677"/>
-            <a:ext cx="9930087" cy="5328000"/>
+            <a:off x="4541841" y="3430588"/>
+            <a:ext cx="2389459" cy="1440712"/>
           </a:xfrm>
           <a:prstGeom prst="rect">
             <a:avLst/>
           </a:prstGeom>
           <a:solidFill>
-            <a:srgbClr val="FFFFFF"/>
+            <a:srgbClr val="007CBC">
+              <a:alpha val="9804"/>
+            </a:srgbClr>
           </a:solidFill>
           <a:ln w="12700">
             <a:noFill/>
+            <a:prstDash val="dash"/>
           </a:ln>
         </p:spPr>
         <p:style>
@@ -1128,29 +1131,37 @@
           </a:fontRef>
         </p:style>
         <p:txBody>
-          <a:bodyPr rot="0" spcFirstLastPara="0" vertOverflow="overflow" horzOverflow="overflow" vert="horz" wrap="square" lIns="91440" tIns="91440" rIns="91440" bIns="45720" numCol="1" spcCol="0" rtlCol="0" fromWordArt="0" anchor="t" anchorCtr="0" forceAA="0" compatLnSpc="1">
-            <a:prstTxWarp prst="textNoShape">
-              <a:avLst/>
-            </a:prstTxWarp>
-            <a:noAutofit/>
-          </a:bodyPr>
+          <a:bodyPr lIns="502920"/>
           <a:lstStyle/>
           <a:p>
-            <a:pPr algn="l"/>
-            <a:endParaRPr lang="en-US" sz="1200" dirty="0">
-              <a:solidFill>
-                <a:schemeClr val="tx2"/>
-              </a:solidFill>
-            </a:endParaRPr>
+            <a:pPr eaLnBrk="1" fontAlgn="auto" hangingPunct="1">
+              <a:spcBef>
+                <a:spcPts val="0"/>
+              </a:spcBef>
+              <a:spcAft>
+                <a:spcPts val="0"/>
+              </a:spcAft>
+              <a:defRPr/>
+            </a:pPr>
+            <a:r>
+              <a:rPr lang="en-US" sz="1200" dirty="0">
+                <a:solidFill>
+                  <a:srgbClr val="5B9CD5"/>
+                </a:solidFill>
+                <a:latin typeface="Arial" panose="020B0604020202020204" pitchFamily="34" charset="0"/>
+                <a:cs typeface="Arial" panose="020B0604020202020204" pitchFamily="34" charset="0"/>
+              </a:rPr>
+              <a:t>Private subnet</a:t>
+            </a:r>
           </a:p>
         </p:txBody>
       </p:sp>
       <p:sp>
         <p:nvSpPr>
-          <p:cNvPr id="53" name="Rectangle 52">
+          <p:cNvPr id="34" name="Rectangle 33">
             <a:extLst>
               <a:ext uri="{FF2B5EF4-FFF2-40B4-BE49-F238E27FC236}">
-                <a16:creationId xmlns:a16="http://schemas.microsoft.com/office/drawing/2014/main" id="{B2229856-53BE-4544-BF16-865F190EA5EB}"/>
+                <a16:creationId xmlns:a16="http://schemas.microsoft.com/office/drawing/2014/main" id="{3A1331EF-85FD-4DAB-8B3B-1608C8B88CEB}"/>
               </a:ext>
             </a:extLst>
           </p:cNvPr>
@@ -1159,8 +1170,8 @@
         </p:nvSpPr>
         <p:spPr>
           <a:xfrm>
-            <a:off x="4484167" y="1553521"/>
-            <a:ext cx="2474928" cy="1787440"/>
+            <a:off x="4541841" y="1427174"/>
+            <a:ext cx="2398881" cy="1832631"/>
           </a:xfrm>
           <a:prstGeom prst="rect">
             <a:avLst/>
@@ -1172,7 +1183,7 @@
           </a:solidFill>
           <a:ln w="12700">
             <a:noFill/>
-            <a:prstDash val="solid"/>
+            <a:prstDash val="dash"/>
           </a:ln>
         </p:spPr>
         <p:style>
@@ -1192,15 +1203,18 @@
           </a:fontRef>
         </p:style>
         <p:txBody>
-          <a:bodyPr rot="0" spcFirstLastPara="0" vertOverflow="overflow" horzOverflow="overflow" vert="horz" wrap="square" lIns="338328" tIns="45720" rIns="91440" bIns="45720" numCol="1" spcCol="0" rtlCol="0" fromWordArt="0" anchor="t" anchorCtr="0" forceAA="0" compatLnSpc="1">
-            <a:prstTxWarp prst="textNoShape">
-              <a:avLst/>
-            </a:prstTxWarp>
-            <a:noAutofit/>
-          </a:bodyPr>
+          <a:bodyPr lIns="502920"/>
           <a:lstStyle/>
           <a:p>
-            <a:pPr algn="l"/>
+            <a:pPr eaLnBrk="1" fontAlgn="auto" hangingPunct="1">
+              <a:spcBef>
+                <a:spcPts val="0"/>
+              </a:spcBef>
+              <a:spcAft>
+                <a:spcPts val="0"/>
+              </a:spcAft>
+              <a:defRPr/>
+            </a:pPr>
             <a:r>
               <a:rPr lang="en-US" sz="1200" dirty="0">
                 <a:solidFill>
@@ -1216,10 +1230,10 @@
       </p:sp>
       <p:sp>
         <p:nvSpPr>
-          <p:cNvPr id="56" name="Rectangle 55">
+          <p:cNvPr id="60" name="Rectangle 59">
             <a:extLst>
               <a:ext uri="{FF2B5EF4-FFF2-40B4-BE49-F238E27FC236}">
-                <a16:creationId xmlns:a16="http://schemas.microsoft.com/office/drawing/2014/main" id="{1EE01857-225E-7741-A12B-8119C6FD5411}"/>
+                <a16:creationId xmlns:a16="http://schemas.microsoft.com/office/drawing/2014/main" id="{07D7109E-BEF0-324E-9A5A-67C32AFB3027}"/>
               </a:ext>
             </a:extLst>
           </p:cNvPr>
@@ -1228,279 +1242,8 @@
         </p:nvSpPr>
         <p:spPr>
           <a:xfrm>
-            <a:off x="1465085" y="1553521"/>
-            <a:ext cx="2474928" cy="1797230"/>
-          </a:xfrm>
-          <a:prstGeom prst="rect">
-            <a:avLst/>
-          </a:prstGeom>
-          <a:solidFill>
-            <a:srgbClr val="1D8900">
-              <a:alpha val="9804"/>
-            </a:srgbClr>
-          </a:solidFill>
-          <a:ln w="12700">
-            <a:noFill/>
-            <a:prstDash val="solid"/>
-          </a:ln>
-        </p:spPr>
-        <p:style>
-          <a:lnRef idx="2">
-            <a:schemeClr val="accent1">
-              <a:shade val="50000"/>
-            </a:schemeClr>
-          </a:lnRef>
-          <a:fillRef idx="1">
-            <a:schemeClr val="accent1"/>
-          </a:fillRef>
-          <a:effectRef idx="0">
-            <a:schemeClr val="accent1"/>
-          </a:effectRef>
-          <a:fontRef idx="minor">
-            <a:schemeClr val="lt1"/>
-          </a:fontRef>
-        </p:style>
-        <p:txBody>
-          <a:bodyPr rot="0" spcFirstLastPara="0" vertOverflow="overflow" horzOverflow="overflow" vert="horz" wrap="square" lIns="338328" tIns="45720" rIns="91440" bIns="45720" numCol="1" spcCol="0" rtlCol="0" fromWordArt="0" anchor="t" anchorCtr="0" forceAA="0" compatLnSpc="1">
-            <a:prstTxWarp prst="textNoShape">
-              <a:avLst/>
-            </a:prstTxWarp>
-            <a:noAutofit/>
-          </a:bodyPr>
-          <a:lstStyle/>
-          <a:p>
-            <a:pPr algn="l"/>
-            <a:r>
-              <a:rPr lang="en-US" sz="1200" dirty="0">
-                <a:solidFill>
-                  <a:srgbClr val="1E8900"/>
-                </a:solidFill>
-                <a:latin typeface="Arial" panose="020B0604020202020204" pitchFamily="34" charset="0"/>
-                <a:cs typeface="Arial" panose="020B0604020202020204" pitchFamily="34" charset="0"/>
-              </a:rPr>
-              <a:t>Public subnet</a:t>
-            </a:r>
-          </a:p>
-        </p:txBody>
-      </p:sp>
-      <p:sp>
-        <p:nvSpPr>
-          <p:cNvPr id="57" name="Rectangle 56">
-            <a:extLst>
-              <a:ext uri="{FF2B5EF4-FFF2-40B4-BE49-F238E27FC236}">
-                <a16:creationId xmlns:a16="http://schemas.microsoft.com/office/drawing/2014/main" id="{37703C61-09E8-4049-8248-F9AB232E14C1}"/>
-              </a:ext>
-            </a:extLst>
-          </p:cNvPr>
-          <p:cNvSpPr/>
-          <p:nvPr/>
-        </p:nvSpPr>
-        <p:spPr>
-          <a:xfrm>
-            <a:off x="871604" y="1101198"/>
-            <a:ext cx="6456512" cy="4075311"/>
-          </a:xfrm>
-          <a:prstGeom prst="rect">
-            <a:avLst/>
-          </a:prstGeom>
-          <a:noFill/>
-          <a:ln w="12700">
-            <a:solidFill>
-              <a:srgbClr val="1E8900"/>
-            </a:solidFill>
-          </a:ln>
-        </p:spPr>
-        <p:style>
-          <a:lnRef idx="2">
-            <a:schemeClr val="accent1">
-              <a:shade val="50000"/>
-            </a:schemeClr>
-          </a:lnRef>
-          <a:fillRef idx="1">
-            <a:schemeClr val="accent1"/>
-          </a:fillRef>
-          <a:effectRef idx="0">
-            <a:schemeClr val="accent1"/>
-          </a:effectRef>
-          <a:fontRef idx="minor">
-            <a:schemeClr val="lt1"/>
-          </a:fontRef>
-        </p:style>
-        <p:txBody>
-          <a:bodyPr rot="0" spcFirstLastPara="0" vertOverflow="overflow" horzOverflow="overflow" vert="horz" wrap="square" lIns="457200" tIns="91440" rIns="91440" bIns="45720" numCol="1" spcCol="0" rtlCol="0" fromWordArt="0" anchor="t" anchorCtr="0" forceAA="0" compatLnSpc="1">
-            <a:prstTxWarp prst="textNoShape">
-              <a:avLst/>
-            </a:prstTxWarp>
-            <a:noAutofit/>
-          </a:bodyPr>
-          <a:lstStyle/>
-          <a:p>
-            <a:pPr algn="l"/>
-            <a:r>
-              <a:rPr lang="en-US" sz="1200" dirty="0">
-                <a:ln w="0"/>
-                <a:solidFill>
-                  <a:srgbClr val="1E8900"/>
-                </a:solidFill>
-                <a:latin typeface="Arial" panose="020B0604020202020204" pitchFamily="34" charset="0"/>
-                <a:cs typeface="Arial" panose="020B0604020202020204" pitchFamily="34" charset="0"/>
-              </a:rPr>
-              <a:t>VPC</a:t>
-            </a:r>
-          </a:p>
-        </p:txBody>
-      </p:sp>
-      <p:sp>
-        <p:nvSpPr>
-          <p:cNvPr id="58" name="Rectangle 57">
-            <a:extLst>
-              <a:ext uri="{FF2B5EF4-FFF2-40B4-BE49-F238E27FC236}">
-                <a16:creationId xmlns:a16="http://schemas.microsoft.com/office/drawing/2014/main" id="{CA9FC015-58A6-074B-8C1E-732DA3337466}"/>
-              </a:ext>
-            </a:extLst>
-          </p:cNvPr>
-          <p:cNvSpPr/>
-          <p:nvPr/>
-        </p:nvSpPr>
-        <p:spPr>
-          <a:xfrm>
-            <a:off x="1467065" y="3639810"/>
-            <a:ext cx="2470969" cy="1520867"/>
-          </a:xfrm>
-          <a:prstGeom prst="rect">
-            <a:avLst/>
-          </a:prstGeom>
-          <a:solidFill>
-            <a:srgbClr val="007CBC">
-              <a:alpha val="9804"/>
-            </a:srgbClr>
-          </a:solidFill>
-          <a:ln w="12700">
-            <a:noFill/>
-            <a:prstDash val="solid"/>
-          </a:ln>
-        </p:spPr>
-        <p:style>
-          <a:lnRef idx="2">
-            <a:schemeClr val="accent1">
-              <a:shade val="50000"/>
-            </a:schemeClr>
-          </a:lnRef>
-          <a:fillRef idx="1">
-            <a:schemeClr val="accent1"/>
-          </a:fillRef>
-          <a:effectRef idx="0">
-            <a:schemeClr val="accent1"/>
-          </a:effectRef>
-          <a:fontRef idx="minor">
-            <a:schemeClr val="lt1"/>
-          </a:fontRef>
-        </p:style>
-        <p:txBody>
-          <a:bodyPr rot="0" spcFirstLastPara="0" vertOverflow="overflow" horzOverflow="overflow" vert="horz" wrap="square" lIns="338328" tIns="45720" rIns="91440" bIns="45720" numCol="1" spcCol="0" rtlCol="0" fromWordArt="0" anchor="t" anchorCtr="0" forceAA="0" compatLnSpc="1">
-            <a:prstTxWarp prst="textNoShape">
-              <a:avLst/>
-            </a:prstTxWarp>
-            <a:noAutofit/>
-          </a:bodyPr>
-          <a:lstStyle/>
-          <a:p>
-            <a:pPr algn="l"/>
-            <a:r>
-              <a:rPr lang="en-US" sz="1200" dirty="0">
-                <a:solidFill>
-                  <a:srgbClr val="007DBC"/>
-                </a:solidFill>
-                <a:latin typeface="Arial" panose="020B0604020202020204" pitchFamily="34" charset="0"/>
-                <a:cs typeface="Arial" panose="020B0604020202020204" pitchFamily="34" charset="0"/>
-              </a:rPr>
-              <a:t>Private subnet</a:t>
-            </a:r>
-          </a:p>
-        </p:txBody>
-      </p:sp>
-      <p:sp>
-        <p:nvSpPr>
-          <p:cNvPr id="59" name="Rectangle 58">
-            <a:extLst>
-              <a:ext uri="{FF2B5EF4-FFF2-40B4-BE49-F238E27FC236}">
-                <a16:creationId xmlns:a16="http://schemas.microsoft.com/office/drawing/2014/main" id="{540B6412-6E5D-B24E-8630-AD02E15A85EC}"/>
-              </a:ext>
-            </a:extLst>
-          </p:cNvPr>
-          <p:cNvSpPr/>
-          <p:nvPr/>
-        </p:nvSpPr>
-        <p:spPr>
-          <a:xfrm>
-            <a:off x="706503" y="341189"/>
-            <a:ext cx="8041902" cy="5157911"/>
-          </a:xfrm>
-          <a:prstGeom prst="rect">
-            <a:avLst/>
-          </a:prstGeom>
-          <a:noFill/>
-          <a:ln w="12700">
-            <a:solidFill>
-              <a:schemeClr val="tx1"/>
-            </a:solidFill>
-          </a:ln>
-        </p:spPr>
-        <p:style>
-          <a:lnRef idx="2">
-            <a:schemeClr val="accent1">
-              <a:shade val="50000"/>
-            </a:schemeClr>
-          </a:lnRef>
-          <a:fillRef idx="1">
-            <a:schemeClr val="accent1"/>
-          </a:fillRef>
-          <a:effectRef idx="0">
-            <a:schemeClr val="accent1"/>
-          </a:effectRef>
-          <a:fontRef idx="minor">
-            <a:schemeClr val="lt1"/>
-          </a:fontRef>
-        </p:style>
-        <p:txBody>
-          <a:bodyPr rot="0" spcFirstLastPara="0" vertOverflow="overflow" horzOverflow="overflow" vert="horz" wrap="square" lIns="457200" tIns="91440" rIns="91440" bIns="45720" numCol="1" spcCol="0" rtlCol="0" fromWordArt="0" anchor="t" anchorCtr="0" forceAA="0" compatLnSpc="1">
-            <a:prstTxWarp prst="textNoShape">
-              <a:avLst/>
-            </a:prstTxWarp>
-            <a:noAutofit/>
-          </a:bodyPr>
-          <a:lstStyle/>
-          <a:p>
-            <a:pPr algn="l"/>
-            <a:r>
-              <a:rPr lang="en-US" sz="1200" dirty="0">
-                <a:solidFill>
-                  <a:sysClr val="windowText" lastClr="000000"/>
-                </a:solidFill>
-                <a:latin typeface="Arial" panose="020B0604020202020204" pitchFamily="34" charset="0"/>
-                <a:cs typeface="Arial" panose="020B0604020202020204" pitchFamily="34" charset="0"/>
-              </a:rPr>
-              <a:t>AWS Cloud</a:t>
-            </a:r>
-          </a:p>
-        </p:txBody>
-      </p:sp>
-      <p:sp>
-        <p:nvSpPr>
-          <p:cNvPr id="60" name="Rectangle 59">
-            <a:extLst>
-              <a:ext uri="{FF2B5EF4-FFF2-40B4-BE49-F238E27FC236}">
-                <a16:creationId xmlns:a16="http://schemas.microsoft.com/office/drawing/2014/main" id="{07D7109E-BEF0-324E-9A5A-67C32AFB3027}"/>
-              </a:ext>
-            </a:extLst>
-          </p:cNvPr>
-          <p:cNvSpPr/>
-          <p:nvPr/>
-        </p:nvSpPr>
-        <p:spPr>
-          <a:xfrm>
-            <a:off x="1280791" y="788789"/>
-            <a:ext cx="2801521" cy="4596012"/>
+            <a:off x="1259525" y="701749"/>
+            <a:ext cx="2779776" cy="4508204"/>
           </a:xfrm>
           <a:prstGeom prst="rect">
             <a:avLst/>
@@ -1552,150 +1295,6 @@
           </a:p>
         </p:txBody>
       </p:sp>
-      <p:pic>
-        <p:nvPicPr>
-          <p:cNvPr id="62" name="Graphic 61">
-            <a:extLst>
-              <a:ext uri="{FF2B5EF4-FFF2-40B4-BE49-F238E27FC236}">
-                <a16:creationId xmlns:a16="http://schemas.microsoft.com/office/drawing/2014/main" id="{89490AF9-EFA6-8440-9A79-E963D0EE7295}"/>
-              </a:ext>
-            </a:extLst>
-          </p:cNvPr>
-          <p:cNvPicPr>
-            <a:picLocks noChangeAspect="1"/>
-          </p:cNvPicPr>
-          <p:nvPr/>
-        </p:nvPicPr>
-        <p:blipFill>
-          <a:blip r:embed="rId2">
-            <a:extLst>
-              <a:ext uri="{96DAC541-7B7A-43D3-8B79-37D633B846F1}">
-                <asvg:svgBlip xmlns:asvg="http://schemas.microsoft.com/office/drawing/2016/SVG/main" r:embed="rId3"/>
-              </a:ext>
-            </a:extLst>
-          </a:blip>
-          <a:stretch>
-            <a:fillRect/>
-          </a:stretch>
-        </p:blipFill>
-        <p:spPr>
-          <a:xfrm>
-            <a:off x="706504" y="341189"/>
-            <a:ext cx="330200" cy="330200"/>
-          </a:xfrm>
-          <a:prstGeom prst="rect">
-            <a:avLst/>
-          </a:prstGeom>
-        </p:spPr>
-      </p:pic>
-      <p:pic>
-        <p:nvPicPr>
-          <p:cNvPr id="63" name="Graphic 62">
-            <a:extLst>
-              <a:ext uri="{FF2B5EF4-FFF2-40B4-BE49-F238E27FC236}">
-                <a16:creationId xmlns:a16="http://schemas.microsoft.com/office/drawing/2014/main" id="{1FB42D1C-3EBE-4F44-AEEF-747AE0502066}"/>
-              </a:ext>
-            </a:extLst>
-          </p:cNvPr>
-          <p:cNvPicPr>
-            <a:picLocks noChangeAspect="1"/>
-          </p:cNvPicPr>
-          <p:nvPr/>
-        </p:nvPicPr>
-        <p:blipFill>
-          <a:blip r:embed="rId4">
-            <a:extLst>
-              <a:ext uri="{96DAC541-7B7A-43D3-8B79-37D633B846F1}">
-                <asvg:svgBlip xmlns:asvg="http://schemas.microsoft.com/office/drawing/2016/SVG/main" r:embed="rId5"/>
-              </a:ext>
-            </a:extLst>
-          </a:blip>
-          <a:stretch>
-            <a:fillRect/>
-          </a:stretch>
-        </p:blipFill>
-        <p:spPr>
-          <a:xfrm>
-            <a:off x="871079" y="1103223"/>
-            <a:ext cx="330200" cy="330200"/>
-          </a:xfrm>
-          <a:prstGeom prst="rect">
-            <a:avLst/>
-          </a:prstGeom>
-        </p:spPr>
-      </p:pic>
-      <p:pic>
-        <p:nvPicPr>
-          <p:cNvPr id="64" name="Graphic 63">
-            <a:extLst>
-              <a:ext uri="{FF2B5EF4-FFF2-40B4-BE49-F238E27FC236}">
-                <a16:creationId xmlns:a16="http://schemas.microsoft.com/office/drawing/2014/main" id="{EF801B6A-5039-A74B-9F9A-63AABA56CBE2}"/>
-              </a:ext>
-            </a:extLst>
-          </p:cNvPr>
-          <p:cNvPicPr>
-            <a:picLocks noChangeAspect="1"/>
-          </p:cNvPicPr>
-          <p:nvPr/>
-        </p:nvPicPr>
-        <p:blipFill>
-          <a:blip r:embed="rId6">
-            <a:extLst>
-              <a:ext uri="{96DAC541-7B7A-43D3-8B79-37D633B846F1}">
-                <asvg:svgBlip xmlns:asvg="http://schemas.microsoft.com/office/drawing/2016/SVG/main" r:embed="rId7"/>
-              </a:ext>
-            </a:extLst>
-          </a:blip>
-          <a:stretch>
-            <a:fillRect/>
-          </a:stretch>
-        </p:blipFill>
-        <p:spPr>
-          <a:xfrm>
-            <a:off x="1465085" y="1551162"/>
-            <a:ext cx="274320" cy="274320"/>
-          </a:xfrm>
-          <a:prstGeom prst="rect">
-            <a:avLst/>
-          </a:prstGeom>
-        </p:spPr>
-      </p:pic>
-      <p:pic>
-        <p:nvPicPr>
-          <p:cNvPr id="65" name="Graphic 64">
-            <a:extLst>
-              <a:ext uri="{FF2B5EF4-FFF2-40B4-BE49-F238E27FC236}">
-                <a16:creationId xmlns:a16="http://schemas.microsoft.com/office/drawing/2014/main" id="{AC206ECC-58BE-5848-AAD5-D6896DE2C67E}"/>
-              </a:ext>
-            </a:extLst>
-          </p:cNvPr>
-          <p:cNvPicPr>
-            <a:picLocks noChangeAspect="1"/>
-          </p:cNvPicPr>
-          <p:nvPr/>
-        </p:nvPicPr>
-        <p:blipFill>
-          <a:blip r:embed="rId8">
-            <a:extLst>
-              <a:ext uri="{96DAC541-7B7A-43D3-8B79-37D633B846F1}">
-                <asvg:svgBlip xmlns:asvg="http://schemas.microsoft.com/office/drawing/2016/SVG/main" r:embed="rId9"/>
-              </a:ext>
-            </a:extLst>
-          </a:blip>
-          <a:stretch>
-            <a:fillRect/>
-          </a:stretch>
-        </p:blipFill>
-        <p:spPr>
-          <a:xfrm>
-            <a:off x="1468789" y="3648856"/>
-            <a:ext cx="274320" cy="274320"/>
-          </a:xfrm>
-          <a:prstGeom prst="rect">
-            <a:avLst/>
-          </a:prstGeom>
-        </p:spPr>
-      </p:pic>
       <p:sp>
         <p:nvSpPr>
           <p:cNvPr id="66" name="TextBox 65">
@@ -1710,7 +1309,7 @@
         </p:nvSpPr>
         <p:spPr>
           <a:xfrm>
-            <a:off x="2125960" y="2661333"/>
+            <a:off x="2099735" y="2661333"/>
             <a:ext cx="1153178" cy="276999"/>
           </a:xfrm>
           <a:prstGeom prst="rect">
@@ -1750,10 +1349,10 @@
           <p:nvPr/>
         </p:nvPicPr>
         <p:blipFill>
-          <a:blip r:embed="rId10">
+          <a:blip r:embed="rId2">
             <a:extLst>
               <a:ext uri="{96DAC541-7B7A-43D3-8B79-37D633B846F1}">
-                <asvg:svgBlip xmlns:asvg="http://schemas.microsoft.com/office/drawing/2016/SVG/main" r:embed="rId11"/>
+                <asvg:svgBlip xmlns:asvg="http://schemas.microsoft.com/office/drawing/2016/SVG/main" r:embed="rId3"/>
               </a:ext>
             </a:extLst>
           </a:blip>
@@ -1785,7 +1384,7 @@
         </p:nvSpPr>
         <p:spPr>
           <a:xfrm>
-            <a:off x="7328641" y="2691981"/>
+            <a:off x="7445604" y="2691981"/>
             <a:ext cx="1419764" cy="523220"/>
           </a:xfrm>
           <a:prstGeom prst="rect">
@@ -1824,7 +1423,7 @@
         </p:nvSpPr>
         <p:spPr>
           <a:xfrm>
-            <a:off x="8894420" y="4516604"/>
+            <a:off x="8884481" y="4313480"/>
             <a:ext cx="1783278" cy="461665"/>
           </a:xfrm>
           <a:prstGeom prst="rect">
@@ -1851,10 +1450,10 @@
       </p:sp>
       <p:sp>
         <p:nvSpPr>
-          <p:cNvPr id="80" name="Rectangle 79">
+          <p:cNvPr id="81" name="Rectangle 80">
             <a:extLst>
               <a:ext uri="{FF2B5EF4-FFF2-40B4-BE49-F238E27FC236}">
-                <a16:creationId xmlns:a16="http://schemas.microsoft.com/office/drawing/2014/main" id="{E8852DB1-68FE-9F4C-8AAC-F033BE8FB59C}"/>
+                <a16:creationId xmlns:a16="http://schemas.microsoft.com/office/drawing/2014/main" id="{BCFAFE42-3485-8444-ACC9-42B82C4BBC28}"/>
               </a:ext>
             </a:extLst>
           </p:cNvPr>
@@ -1863,77 +1462,8 @@
         </p:nvSpPr>
         <p:spPr>
           <a:xfrm>
-            <a:off x="4483298" y="3642174"/>
-            <a:ext cx="2470969" cy="1424609"/>
-          </a:xfrm>
-          <a:prstGeom prst="rect">
-            <a:avLst/>
-          </a:prstGeom>
-          <a:solidFill>
-            <a:srgbClr val="007CBC">
-              <a:alpha val="9804"/>
-            </a:srgbClr>
-          </a:solidFill>
-          <a:ln w="12700">
-            <a:noFill/>
-            <a:prstDash val="solid"/>
-          </a:ln>
-        </p:spPr>
-        <p:style>
-          <a:lnRef idx="2">
-            <a:schemeClr val="accent1">
-              <a:shade val="50000"/>
-            </a:schemeClr>
-          </a:lnRef>
-          <a:fillRef idx="1">
-            <a:schemeClr val="accent1"/>
-          </a:fillRef>
-          <a:effectRef idx="0">
-            <a:schemeClr val="accent1"/>
-          </a:effectRef>
-          <a:fontRef idx="minor">
-            <a:schemeClr val="lt1"/>
-          </a:fontRef>
-        </p:style>
-        <p:txBody>
-          <a:bodyPr rot="0" spcFirstLastPara="0" vertOverflow="overflow" horzOverflow="overflow" vert="horz" wrap="square" lIns="338328" tIns="45720" rIns="91440" bIns="45720" numCol="1" spcCol="0" rtlCol="0" fromWordArt="0" anchor="t" anchorCtr="0" forceAA="0" compatLnSpc="1">
-            <a:prstTxWarp prst="textNoShape">
-              <a:avLst/>
-            </a:prstTxWarp>
-            <a:noAutofit/>
-          </a:bodyPr>
-          <a:lstStyle/>
-          <a:p>
-            <a:pPr algn="l"/>
-            <a:r>
-              <a:rPr lang="en-US" sz="1200" dirty="0">
-                <a:solidFill>
-                  <a:srgbClr val="007DBC"/>
-                </a:solidFill>
-                <a:latin typeface="Arial" panose="020B0604020202020204" pitchFamily="34" charset="0"/>
-                <a:cs typeface="Arial" panose="020B0604020202020204" pitchFamily="34" charset="0"/>
-              </a:rPr>
-              <a:t>Private subnet</a:t>
-            </a:r>
-          </a:p>
-        </p:txBody>
-      </p:sp>
-      <p:sp>
-        <p:nvSpPr>
-          <p:cNvPr id="81" name="Rectangle 80">
-            <a:extLst>
-              <a:ext uri="{FF2B5EF4-FFF2-40B4-BE49-F238E27FC236}">
-                <a16:creationId xmlns:a16="http://schemas.microsoft.com/office/drawing/2014/main" id="{BCFAFE42-3485-8444-ACC9-42B82C4BBC28}"/>
-              </a:ext>
-            </a:extLst>
-          </p:cNvPr>
-          <p:cNvSpPr/>
-          <p:nvPr/>
-        </p:nvSpPr>
-        <p:spPr>
-          <a:xfrm>
-            <a:off x="4330582" y="788789"/>
-            <a:ext cx="2782099" cy="4586222"/>
+            <a:off x="4330582" y="701749"/>
+            <a:ext cx="2782099" cy="4508204"/>
           </a:xfrm>
           <a:prstGeom prst="rect">
             <a:avLst/>
@@ -1985,78 +1515,6 @@
           </a:p>
         </p:txBody>
       </p:sp>
-      <p:pic>
-        <p:nvPicPr>
-          <p:cNvPr id="82" name="Graphic 81">
-            <a:extLst>
-              <a:ext uri="{FF2B5EF4-FFF2-40B4-BE49-F238E27FC236}">
-                <a16:creationId xmlns:a16="http://schemas.microsoft.com/office/drawing/2014/main" id="{D8C3DF26-3C24-AC44-AFF6-FF217710069A}"/>
-              </a:ext>
-            </a:extLst>
-          </p:cNvPr>
-          <p:cNvPicPr>
-            <a:picLocks noChangeAspect="1"/>
-          </p:cNvPicPr>
-          <p:nvPr/>
-        </p:nvPicPr>
-        <p:blipFill>
-          <a:blip r:embed="rId6">
-            <a:extLst>
-              <a:ext uri="{96DAC541-7B7A-43D3-8B79-37D633B846F1}">
-                <asvg:svgBlip xmlns:asvg="http://schemas.microsoft.com/office/drawing/2016/SVG/main" r:embed="rId7"/>
-              </a:ext>
-            </a:extLst>
-          </a:blip>
-          <a:stretch>
-            <a:fillRect/>
-          </a:stretch>
-        </p:blipFill>
-        <p:spPr>
-          <a:xfrm>
-            <a:off x="4483298" y="1544331"/>
-            <a:ext cx="274320" cy="274320"/>
-          </a:xfrm>
-          <a:prstGeom prst="rect">
-            <a:avLst/>
-          </a:prstGeom>
-        </p:spPr>
-      </p:pic>
-      <p:pic>
-        <p:nvPicPr>
-          <p:cNvPr id="83" name="Graphic 82">
-            <a:extLst>
-              <a:ext uri="{FF2B5EF4-FFF2-40B4-BE49-F238E27FC236}">
-                <a16:creationId xmlns:a16="http://schemas.microsoft.com/office/drawing/2014/main" id="{259CEA8D-E4D3-F14D-ABF2-BB02362161BE}"/>
-              </a:ext>
-            </a:extLst>
-          </p:cNvPr>
-          <p:cNvPicPr>
-            <a:picLocks noChangeAspect="1"/>
-          </p:cNvPicPr>
-          <p:nvPr/>
-        </p:nvPicPr>
-        <p:blipFill>
-          <a:blip r:embed="rId8">
-            <a:extLst>
-              <a:ext uri="{96DAC541-7B7A-43D3-8B79-37D633B846F1}">
-                <asvg:svgBlip xmlns:asvg="http://schemas.microsoft.com/office/drawing/2016/SVG/main" r:embed="rId9"/>
-              </a:ext>
-            </a:extLst>
-          </a:blip>
-          <a:stretch>
-            <a:fillRect/>
-          </a:stretch>
-        </p:blipFill>
-        <p:spPr>
-          <a:xfrm>
-            <a:off x="4477733" y="3633610"/>
-            <a:ext cx="274320" cy="274320"/>
-          </a:xfrm>
-          <a:prstGeom prst="rect">
-            <a:avLst/>
-          </a:prstGeom>
-        </p:spPr>
-      </p:pic>
       <p:sp>
         <p:nvSpPr>
           <p:cNvPr id="84" name="TextBox 83">
@@ -2111,10 +1569,10 @@
           <p:nvPr/>
         </p:nvPicPr>
         <p:blipFill>
-          <a:blip r:embed="rId10">
+          <a:blip r:embed="rId2">
             <a:extLst>
               <a:ext uri="{96DAC541-7B7A-43D3-8B79-37D633B846F1}">
-                <asvg:svgBlip xmlns:asvg="http://schemas.microsoft.com/office/drawing/2016/SVG/main" r:embed="rId11"/>
+                <asvg:svgBlip xmlns:asvg="http://schemas.microsoft.com/office/drawing/2016/SVG/main" r:embed="rId3"/>
               </a:ext>
             </a:extLst>
           </a:blip>
@@ -2147,7 +1605,7 @@
           <p:nvPr/>
         </p:nvPicPr>
         <p:blipFill>
-          <a:blip r:embed="rId12">
+          <a:blip r:embed="rId4">
             <a:extLst>
               <a:ext uri="{28A0092B-C50C-407E-A947-70E740481C1C}">
                 <a14:useLocalDpi xmlns:a14="http://schemas.microsoft.com/office/drawing/2010/main" val="0"/>
@@ -2161,7 +1619,7 @@
         </p:blipFill>
         <p:spPr bwMode="auto">
           <a:xfrm>
-            <a:off x="9562503" y="4033894"/>
+            <a:off x="9551109" y="3880437"/>
             <a:ext cx="469900" cy="469900"/>
           </a:xfrm>
           <a:prstGeom prst="rect">
@@ -2206,7 +1664,7 @@
         </p:nvSpPr>
         <p:spPr>
           <a:xfrm>
-            <a:off x="5204103" y="4503794"/>
+            <a:off x="5139169" y="4322620"/>
             <a:ext cx="1132415" cy="461665"/>
           </a:xfrm>
           <a:prstGeom prst="rect">
@@ -2257,7 +1715,7 @@
         </p:nvCxnSpPr>
         <p:spPr>
           <a:xfrm>
-            <a:off x="5953732" y="4266582"/>
+            <a:off x="5931539" y="4076425"/>
             <a:ext cx="3568481" cy="0"/>
           </a:xfrm>
           <a:prstGeom prst="straightConnector1">
@@ -2301,7 +1759,7 @@
           <p:nvPr/>
         </p:nvPicPr>
         <p:blipFill>
-          <a:blip r:embed="rId13">
+          <a:blip r:embed="rId5">
             <a:extLst>
               <a:ext uri="{28A0092B-C50C-407E-A947-70E740481C1C}">
                 <a14:useLocalDpi xmlns:a14="http://schemas.microsoft.com/office/drawing/2010/main" val="0"/>
@@ -2315,7 +1773,7 @@
         </p:blipFill>
         <p:spPr bwMode="auto">
           <a:xfrm>
-            <a:off x="7670681" y="1841081"/>
+            <a:off x="7787644" y="1841081"/>
             <a:ext cx="762000" cy="762000"/>
           </a:xfrm>
           <a:prstGeom prst="rect">
@@ -2361,7 +1819,7 @@
           <p:nvPr/>
         </p:nvPicPr>
         <p:blipFill>
-          <a:blip r:embed="rId14">
+          <a:blip r:embed="rId6">
             <a:extLst>
               <a:ext uri="{28A0092B-C50C-407E-A947-70E740481C1C}">
                 <a14:useLocalDpi xmlns:a14="http://schemas.microsoft.com/office/drawing/2010/main" val="0"/>
@@ -2375,7 +1833,7 @@
         </p:blipFill>
         <p:spPr bwMode="auto">
           <a:xfrm>
-            <a:off x="5483832" y="2133181"/>
+            <a:off x="5487868" y="2066844"/>
             <a:ext cx="469900" cy="469900"/>
           </a:xfrm>
           <a:prstGeom prst="rect">
@@ -2421,7 +1879,7 @@
           <p:nvPr/>
         </p:nvPicPr>
         <p:blipFill>
-          <a:blip r:embed="rId14">
+          <a:blip r:embed="rId6">
             <a:extLst>
               <a:ext uri="{28A0092B-C50C-407E-A947-70E740481C1C}">
                 <a14:useLocalDpi xmlns:a14="http://schemas.microsoft.com/office/drawing/2010/main" val="0"/>
@@ -2435,7 +1893,7 @@
         </p:blipFill>
         <p:spPr bwMode="auto">
           <a:xfrm>
-            <a:off x="2467599" y="2133181"/>
+            <a:off x="2425176" y="2113428"/>
             <a:ext cx="469900" cy="469900"/>
           </a:xfrm>
           <a:prstGeom prst="rect">
@@ -2481,7 +1939,7 @@
           <p:nvPr/>
         </p:nvPicPr>
         <p:blipFill>
-          <a:blip r:embed="rId15">
+          <a:blip r:embed="rId7">
             <a:extLst>
               <a:ext uri="{28A0092B-C50C-407E-A947-70E740481C1C}">
                 <a14:useLocalDpi xmlns:a14="http://schemas.microsoft.com/office/drawing/2010/main" val="0"/>
@@ -2495,7 +1953,7 @@
         </p:blipFill>
         <p:spPr bwMode="auto">
           <a:xfrm>
-            <a:off x="5483832" y="4031632"/>
+            <a:off x="5483831" y="3848971"/>
             <a:ext cx="469900" cy="469900"/>
           </a:xfrm>
           <a:prstGeom prst="rect">
@@ -2524,6 +1982,504 @@
               </a14:hiddenLine>
             </a:ext>
           </a:extLst>
+        </p:spPr>
+      </p:pic>
+      <p:pic>
+        <p:nvPicPr>
+          <p:cNvPr id="35" name="Graphic 34">
+            <a:extLst>
+              <a:ext uri="{FF2B5EF4-FFF2-40B4-BE49-F238E27FC236}">
+                <a16:creationId xmlns:a16="http://schemas.microsoft.com/office/drawing/2014/main" id="{FB34C55D-250B-46C0-B862-067D274E2DA0}"/>
+              </a:ext>
+            </a:extLst>
+          </p:cNvPr>
+          <p:cNvPicPr>
+            <a:picLocks noChangeAspect="1"/>
+          </p:cNvPicPr>
+          <p:nvPr/>
+        </p:nvPicPr>
+        <p:blipFill>
+          <a:blip r:embed="rId8">
+            <a:extLst>
+              <a:ext uri="{96DAC541-7B7A-43D3-8B79-37D633B846F1}">
+                <asvg:svgBlip xmlns:asvg="http://schemas.microsoft.com/office/drawing/2016/SVG/main" r:embed="rId9"/>
+              </a:ext>
+            </a:extLst>
+          </a:blip>
+          <a:stretch>
+            <a:fillRect/>
+          </a:stretch>
+        </p:blipFill>
+        <p:spPr>
+          <a:xfrm>
+            <a:off x="4542477" y="1428763"/>
+            <a:ext cx="381000" cy="381000"/>
+          </a:xfrm>
+          <a:prstGeom prst="rect">
+            <a:avLst/>
+          </a:prstGeom>
+        </p:spPr>
+      </p:pic>
+      <p:sp>
+        <p:nvSpPr>
+          <p:cNvPr id="36" name="Rectangle 35">
+            <a:extLst>
+              <a:ext uri="{FF2B5EF4-FFF2-40B4-BE49-F238E27FC236}">
+                <a16:creationId xmlns:a16="http://schemas.microsoft.com/office/drawing/2014/main" id="{CD8E6BB5-19FB-4634-B913-5FA0AE55AA26}"/>
+              </a:ext>
+            </a:extLst>
+          </p:cNvPr>
+          <p:cNvSpPr/>
+          <p:nvPr/>
+        </p:nvSpPr>
+        <p:spPr>
+          <a:xfrm>
+            <a:off x="1456925" y="1421476"/>
+            <a:ext cx="2398881" cy="1832631"/>
+          </a:xfrm>
+          <a:prstGeom prst="rect">
+            <a:avLst/>
+          </a:prstGeom>
+          <a:solidFill>
+            <a:srgbClr val="1D8900">
+              <a:alpha val="9804"/>
+            </a:srgbClr>
+          </a:solidFill>
+          <a:ln w="12700">
+            <a:noFill/>
+            <a:prstDash val="dash"/>
+          </a:ln>
+        </p:spPr>
+        <p:style>
+          <a:lnRef idx="2">
+            <a:schemeClr val="accent1">
+              <a:shade val="50000"/>
+            </a:schemeClr>
+          </a:lnRef>
+          <a:fillRef idx="1">
+            <a:schemeClr val="accent1"/>
+          </a:fillRef>
+          <a:effectRef idx="0">
+            <a:schemeClr val="accent1"/>
+          </a:effectRef>
+          <a:fontRef idx="minor">
+            <a:schemeClr val="lt1"/>
+          </a:fontRef>
+        </p:style>
+        <p:txBody>
+          <a:bodyPr lIns="502920"/>
+          <a:lstStyle/>
+          <a:p>
+            <a:pPr eaLnBrk="1" fontAlgn="auto" hangingPunct="1">
+              <a:spcBef>
+                <a:spcPts val="0"/>
+              </a:spcBef>
+              <a:spcAft>
+                <a:spcPts val="0"/>
+              </a:spcAft>
+              <a:defRPr/>
+            </a:pPr>
+            <a:r>
+              <a:rPr lang="en-US" sz="1200" dirty="0">
+                <a:solidFill>
+                  <a:srgbClr val="1E8900"/>
+                </a:solidFill>
+                <a:latin typeface="Arial" panose="020B0604020202020204" pitchFamily="34" charset="0"/>
+                <a:cs typeface="Arial" panose="020B0604020202020204" pitchFamily="34" charset="0"/>
+              </a:rPr>
+              <a:t>Public subnet</a:t>
+            </a:r>
+          </a:p>
+        </p:txBody>
+      </p:sp>
+      <p:pic>
+        <p:nvPicPr>
+          <p:cNvPr id="37" name="Graphic 36">
+            <a:extLst>
+              <a:ext uri="{FF2B5EF4-FFF2-40B4-BE49-F238E27FC236}">
+                <a16:creationId xmlns:a16="http://schemas.microsoft.com/office/drawing/2014/main" id="{E5D637FD-E90B-4AEF-B53D-AA202ACCFD16}"/>
+              </a:ext>
+            </a:extLst>
+          </p:cNvPr>
+          <p:cNvPicPr>
+            <a:picLocks noChangeAspect="1"/>
+          </p:cNvPicPr>
+          <p:nvPr/>
+        </p:nvPicPr>
+        <p:blipFill>
+          <a:blip r:embed="rId8">
+            <a:extLst>
+              <a:ext uri="{96DAC541-7B7A-43D3-8B79-37D633B846F1}">
+                <asvg:svgBlip xmlns:asvg="http://schemas.microsoft.com/office/drawing/2016/SVG/main" r:embed="rId9"/>
+              </a:ext>
+            </a:extLst>
+          </a:blip>
+          <a:stretch>
+            <a:fillRect/>
+          </a:stretch>
+        </p:blipFill>
+        <p:spPr>
+          <a:xfrm>
+            <a:off x="1455383" y="1433423"/>
+            <a:ext cx="381000" cy="381000"/>
+          </a:xfrm>
+          <a:prstGeom prst="rect">
+            <a:avLst/>
+          </a:prstGeom>
+        </p:spPr>
+      </p:pic>
+      <p:sp>
+        <p:nvSpPr>
+          <p:cNvPr id="38" name="Rectangle 37">
+            <a:extLst>
+              <a:ext uri="{FF2B5EF4-FFF2-40B4-BE49-F238E27FC236}">
+                <a16:creationId xmlns:a16="http://schemas.microsoft.com/office/drawing/2014/main" id="{28B353D8-78C7-475E-A84D-B62EAEA1A2FB}"/>
+              </a:ext>
+            </a:extLst>
+          </p:cNvPr>
+          <p:cNvSpPr/>
+          <p:nvPr/>
+        </p:nvSpPr>
+        <p:spPr>
+          <a:xfrm>
+            <a:off x="1466346" y="3429000"/>
+            <a:ext cx="2389459" cy="1440712"/>
+          </a:xfrm>
+          <a:prstGeom prst="rect">
+            <a:avLst/>
+          </a:prstGeom>
+          <a:solidFill>
+            <a:srgbClr val="007CBC">
+              <a:alpha val="9804"/>
+            </a:srgbClr>
+          </a:solidFill>
+          <a:ln w="12700">
+            <a:noFill/>
+            <a:prstDash val="dash"/>
+          </a:ln>
+        </p:spPr>
+        <p:style>
+          <a:lnRef idx="2">
+            <a:schemeClr val="accent1">
+              <a:shade val="50000"/>
+            </a:schemeClr>
+          </a:lnRef>
+          <a:fillRef idx="1">
+            <a:schemeClr val="accent1"/>
+          </a:fillRef>
+          <a:effectRef idx="0">
+            <a:schemeClr val="accent1"/>
+          </a:effectRef>
+          <a:fontRef idx="minor">
+            <a:schemeClr val="lt1"/>
+          </a:fontRef>
+        </p:style>
+        <p:txBody>
+          <a:bodyPr lIns="502920"/>
+          <a:lstStyle/>
+          <a:p>
+            <a:pPr eaLnBrk="1" fontAlgn="auto" hangingPunct="1">
+              <a:spcBef>
+                <a:spcPts val="0"/>
+              </a:spcBef>
+              <a:spcAft>
+                <a:spcPts val="0"/>
+              </a:spcAft>
+              <a:defRPr/>
+            </a:pPr>
+            <a:r>
+              <a:rPr lang="en-US" sz="1200" dirty="0">
+                <a:solidFill>
+                  <a:srgbClr val="5B9CD5"/>
+                </a:solidFill>
+                <a:latin typeface="Arial" panose="020B0604020202020204" pitchFamily="34" charset="0"/>
+                <a:cs typeface="Arial" panose="020B0604020202020204" pitchFamily="34" charset="0"/>
+              </a:rPr>
+              <a:t>Private subnet</a:t>
+            </a:r>
+          </a:p>
+        </p:txBody>
+      </p:sp>
+      <p:pic>
+        <p:nvPicPr>
+          <p:cNvPr id="40" name="Graphic 39">
+            <a:extLst>
+              <a:ext uri="{FF2B5EF4-FFF2-40B4-BE49-F238E27FC236}">
+                <a16:creationId xmlns:a16="http://schemas.microsoft.com/office/drawing/2014/main" id="{5F43D29F-DD0D-4888-83AF-8A4F15F98164}"/>
+              </a:ext>
+            </a:extLst>
+          </p:cNvPr>
+          <p:cNvPicPr>
+            <a:picLocks noChangeAspect="1"/>
+          </p:cNvPicPr>
+          <p:nvPr/>
+        </p:nvPicPr>
+        <p:blipFill>
+          <a:blip r:embed="rId10">
+            <a:extLst>
+              <a:ext uri="{96DAC541-7B7A-43D3-8B79-37D633B846F1}">
+                <asvg:svgBlip xmlns:asvg="http://schemas.microsoft.com/office/drawing/2016/SVG/main" r:embed="rId11"/>
+              </a:ext>
+            </a:extLst>
+          </a:blip>
+          <a:stretch>
+            <a:fillRect/>
+          </a:stretch>
+        </p:blipFill>
+        <p:spPr>
+          <a:xfrm>
+            <a:off x="1492375" y="3430588"/>
+            <a:ext cx="381000" cy="381000"/>
+          </a:xfrm>
+          <a:prstGeom prst="rect">
+            <a:avLst/>
+          </a:prstGeom>
+        </p:spPr>
+      </p:pic>
+      <p:pic>
+        <p:nvPicPr>
+          <p:cNvPr id="42" name="Graphic 41">
+            <a:extLst>
+              <a:ext uri="{FF2B5EF4-FFF2-40B4-BE49-F238E27FC236}">
+                <a16:creationId xmlns:a16="http://schemas.microsoft.com/office/drawing/2014/main" id="{F557DC6F-A7C1-4D0E-9611-49E1D18BA296}"/>
+              </a:ext>
+            </a:extLst>
+          </p:cNvPr>
+          <p:cNvPicPr>
+            <a:picLocks noChangeAspect="1"/>
+          </p:cNvPicPr>
+          <p:nvPr/>
+        </p:nvPicPr>
+        <p:blipFill>
+          <a:blip r:embed="rId10">
+            <a:extLst>
+              <a:ext uri="{96DAC541-7B7A-43D3-8B79-37D633B846F1}">
+                <asvg:svgBlip xmlns:asvg="http://schemas.microsoft.com/office/drawing/2016/SVG/main" r:embed="rId11"/>
+              </a:ext>
+            </a:extLst>
+          </a:blip>
+          <a:stretch>
+            <a:fillRect/>
+          </a:stretch>
+        </p:blipFill>
+        <p:spPr>
+          <a:xfrm>
+            <a:off x="4546604" y="3432176"/>
+            <a:ext cx="381000" cy="381000"/>
+          </a:xfrm>
+          <a:prstGeom prst="rect">
+            <a:avLst/>
+          </a:prstGeom>
+        </p:spPr>
+      </p:pic>
+      <p:sp>
+        <p:nvSpPr>
+          <p:cNvPr id="44" name="Rectangle 43">
+            <a:extLst>
+              <a:ext uri="{FF2B5EF4-FFF2-40B4-BE49-F238E27FC236}">
+                <a16:creationId xmlns:a16="http://schemas.microsoft.com/office/drawing/2014/main" id="{81AE80B0-3B28-4C0A-97E5-2312468C105A}"/>
+              </a:ext>
+            </a:extLst>
+          </p:cNvPr>
+          <p:cNvSpPr/>
+          <p:nvPr/>
+        </p:nvSpPr>
+        <p:spPr>
+          <a:xfrm>
+            <a:off x="800225" y="1070971"/>
+            <a:ext cx="6635506" cy="4000760"/>
+          </a:xfrm>
+          <a:prstGeom prst="rect">
+            <a:avLst/>
+          </a:prstGeom>
+          <a:noFill/>
+          <a:ln w="12700">
+            <a:solidFill>
+              <a:srgbClr val="1E8900"/>
+            </a:solidFill>
+          </a:ln>
+        </p:spPr>
+        <p:style>
+          <a:lnRef idx="2">
+            <a:schemeClr val="accent1">
+              <a:shade val="50000"/>
+            </a:schemeClr>
+          </a:lnRef>
+          <a:fillRef idx="1">
+            <a:schemeClr val="accent1"/>
+          </a:fillRef>
+          <a:effectRef idx="0">
+            <a:schemeClr val="accent1"/>
+          </a:effectRef>
+          <a:fontRef idx="minor">
+            <a:schemeClr val="lt1"/>
+          </a:fontRef>
+        </p:style>
+        <p:txBody>
+          <a:bodyPr lIns="502920" tIns="91440"/>
+          <a:lstStyle/>
+          <a:p>
+            <a:pPr eaLnBrk="1" fontAlgn="auto" hangingPunct="1">
+              <a:spcBef>
+                <a:spcPts val="0"/>
+              </a:spcBef>
+              <a:spcAft>
+                <a:spcPts val="0"/>
+              </a:spcAft>
+              <a:defRPr/>
+            </a:pPr>
+            <a:r>
+              <a:rPr lang="en-US" sz="1200" dirty="0">
+                <a:ln w="0"/>
+                <a:solidFill>
+                  <a:srgbClr val="1E8900"/>
+                </a:solidFill>
+                <a:latin typeface="Arial" panose="020B0604020202020204" pitchFamily="34" charset="0"/>
+                <a:cs typeface="Arial" panose="020B0604020202020204" pitchFamily="34" charset="0"/>
+              </a:rPr>
+              <a:t>VPC</a:t>
+            </a:r>
+          </a:p>
+        </p:txBody>
+      </p:sp>
+      <p:pic>
+        <p:nvPicPr>
+          <p:cNvPr id="45" name="Graphic 44">
+            <a:extLst>
+              <a:ext uri="{FF2B5EF4-FFF2-40B4-BE49-F238E27FC236}">
+                <a16:creationId xmlns:a16="http://schemas.microsoft.com/office/drawing/2014/main" id="{62B8A927-9694-4395-892C-E6FFD22116F7}"/>
+              </a:ext>
+            </a:extLst>
+          </p:cNvPr>
+          <p:cNvPicPr>
+            <a:picLocks noChangeAspect="1"/>
+          </p:cNvPicPr>
+          <p:nvPr/>
+        </p:nvPicPr>
+        <p:blipFill>
+          <a:blip r:embed="rId12">
+            <a:extLst>
+              <a:ext uri="{96DAC541-7B7A-43D3-8B79-37D633B846F1}">
+                <asvg:svgBlip xmlns:asvg="http://schemas.microsoft.com/office/drawing/2016/SVG/main" r:embed="rId13"/>
+              </a:ext>
+            </a:extLst>
+          </a:blip>
+          <a:stretch>
+            <a:fillRect/>
+          </a:stretch>
+        </p:blipFill>
+        <p:spPr>
+          <a:xfrm>
+            <a:off x="806449" y="1070971"/>
+            <a:ext cx="381000" cy="381000"/>
+          </a:xfrm>
+          <a:prstGeom prst="rect">
+            <a:avLst/>
+          </a:prstGeom>
+        </p:spPr>
+      </p:pic>
+      <p:sp>
+        <p:nvSpPr>
+          <p:cNvPr id="47" name="Rectangle 46">
+            <a:extLst>
+              <a:ext uri="{FF2B5EF4-FFF2-40B4-BE49-F238E27FC236}">
+                <a16:creationId xmlns:a16="http://schemas.microsoft.com/office/drawing/2014/main" id="{B38090E5-B2EF-4BD6-A1C7-CD3CAD9D4877}"/>
+              </a:ext>
+            </a:extLst>
+          </p:cNvPr>
+          <p:cNvSpPr/>
+          <p:nvPr/>
+        </p:nvSpPr>
+        <p:spPr>
+          <a:xfrm>
+            <a:off x="548928" y="297043"/>
+            <a:ext cx="8284463" cy="5081975"/>
+          </a:xfrm>
+          <a:prstGeom prst="rect">
+            <a:avLst/>
+          </a:prstGeom>
+          <a:noFill/>
+          <a:ln w="12700">
+            <a:solidFill>
+              <a:schemeClr val="tx1"/>
+            </a:solidFill>
+          </a:ln>
+        </p:spPr>
+        <p:style>
+          <a:lnRef idx="2">
+            <a:schemeClr val="accent1">
+              <a:shade val="50000"/>
+            </a:schemeClr>
+          </a:lnRef>
+          <a:fillRef idx="1">
+            <a:schemeClr val="accent1"/>
+          </a:fillRef>
+          <a:effectRef idx="0">
+            <a:schemeClr val="accent1"/>
+          </a:effectRef>
+          <a:fontRef idx="minor">
+            <a:schemeClr val="lt1"/>
+          </a:fontRef>
+        </p:style>
+        <p:txBody>
+          <a:bodyPr lIns="502920" tIns="91440"/>
+          <a:lstStyle/>
+          <a:p>
+            <a:pPr eaLnBrk="1" fontAlgn="auto" hangingPunct="1">
+              <a:spcBef>
+                <a:spcPts val="0"/>
+              </a:spcBef>
+              <a:spcAft>
+                <a:spcPts val="0"/>
+              </a:spcAft>
+              <a:defRPr/>
+            </a:pPr>
+            <a:r>
+              <a:rPr lang="en-US" sz="1200" dirty="0">
+                <a:solidFill>
+                  <a:sysClr val="windowText" lastClr="000000"/>
+                </a:solidFill>
+                <a:latin typeface="Arial" panose="020B0604020202020204" pitchFamily="34" charset="0"/>
+                <a:cs typeface="Arial" panose="020B0604020202020204" pitchFamily="34" charset="0"/>
+              </a:rPr>
+              <a:t>AWS Cloud</a:t>
+            </a:r>
+          </a:p>
+        </p:txBody>
+      </p:sp>
+      <p:pic>
+        <p:nvPicPr>
+          <p:cNvPr id="48" name="Graphic 47">
+            <a:extLst>
+              <a:ext uri="{FF2B5EF4-FFF2-40B4-BE49-F238E27FC236}">
+                <a16:creationId xmlns:a16="http://schemas.microsoft.com/office/drawing/2014/main" id="{19F4BC83-C40D-4E5D-81DE-FBAFC389B0AB}"/>
+              </a:ext>
+            </a:extLst>
+          </p:cNvPr>
+          <p:cNvPicPr>
+            <a:picLocks noChangeAspect="1"/>
+          </p:cNvPicPr>
+          <p:nvPr/>
+        </p:nvPicPr>
+        <p:blipFill>
+          <a:blip r:embed="rId14">
+            <a:extLst>
+              <a:ext uri="{96DAC541-7B7A-43D3-8B79-37D633B846F1}">
+                <asvg:svgBlip xmlns:asvg="http://schemas.microsoft.com/office/drawing/2016/SVG/main" r:embed="rId15"/>
+              </a:ext>
+            </a:extLst>
+          </a:blip>
+          <a:srcRect/>
+          <a:stretch/>
+        </p:blipFill>
+        <p:spPr>
+          <a:xfrm>
+            <a:off x="551711" y="297043"/>
+            <a:ext cx="381000" cy="381000"/>
+          </a:xfrm>
+          <a:prstGeom prst="rect">
+            <a:avLst/>
+          </a:prstGeom>
         </p:spPr>
       </p:pic>
     </p:spTree>

</xml_diff>